<commit_message>
proje sunumunda değişiklikler yapıldı
</commit_message>
<xml_diff>
--- a/proje sunumu.pptx
+++ b/proje sunumu.pptx
@@ -19,7 +19,6 @@
     <p:sldId id="267" r:id="rId13"/>
     <p:sldId id="268" r:id="rId14"/>
     <p:sldId id="269" r:id="rId15"/>
-    <p:sldId id="270" r:id="rId16"/>
   </p:sldIdLst>
   <p:sldSz cx="12192000" cy="6858000"/>
   <p:notesSz cx="6858000" cy="9144000"/>
@@ -848,7 +847,7 @@
           <a:p>
             <a:fld id="{0FD4F65F-40B7-4D2C-9F56-28E1AB17EB0A}" type="datetimeFigureOut">
               <a:rPr lang="tr-TR" smtClean="0"/>
-              <a:t>2.05.2023</a:t>
+              <a:t>14.09.2024</a:t>
             </a:fld>
             <a:endParaRPr lang="tr-TR"/>
           </a:p>
@@ -1099,7 +1098,7 @@
           <a:p>
             <a:fld id="{0FD4F65F-40B7-4D2C-9F56-28E1AB17EB0A}" type="datetimeFigureOut">
               <a:rPr lang="tr-TR" smtClean="0"/>
-              <a:t>2.05.2023</a:t>
+              <a:t>14.09.2024</a:t>
             </a:fld>
             <a:endParaRPr lang="tr-TR"/>
           </a:p>
@@ -1413,7 +1412,7 @@
           <a:p>
             <a:fld id="{0FD4F65F-40B7-4D2C-9F56-28E1AB17EB0A}" type="datetimeFigureOut">
               <a:rPr lang="tr-TR" smtClean="0"/>
-              <a:t>2.05.2023</a:t>
+              <a:t>14.09.2024</a:t>
             </a:fld>
             <a:endParaRPr lang="tr-TR"/>
           </a:p>
@@ -1754,7 +1753,7 @@
           <a:p>
             <a:fld id="{0FD4F65F-40B7-4D2C-9F56-28E1AB17EB0A}" type="datetimeFigureOut">
               <a:rPr lang="tr-TR" smtClean="0"/>
-              <a:t>2.05.2023</a:t>
+              <a:t>14.09.2024</a:t>
             </a:fld>
             <a:endParaRPr lang="tr-TR"/>
           </a:p>
@@ -2068,7 +2067,7 @@
           <a:p>
             <a:fld id="{0FD4F65F-40B7-4D2C-9F56-28E1AB17EB0A}" type="datetimeFigureOut">
               <a:rPr lang="tr-TR" smtClean="0"/>
-              <a:t>2.05.2023</a:t>
+              <a:t>14.09.2024</a:t>
             </a:fld>
             <a:endParaRPr lang="tr-TR"/>
           </a:p>
@@ -2461,7 +2460,7 @@
           <a:p>
             <a:fld id="{0FD4F65F-40B7-4D2C-9F56-28E1AB17EB0A}" type="datetimeFigureOut">
               <a:rPr lang="tr-TR" smtClean="0"/>
-              <a:t>2.05.2023</a:t>
+              <a:t>14.09.2024</a:t>
             </a:fld>
             <a:endParaRPr lang="tr-TR"/>
           </a:p>
@@ -2631,7 +2630,7 @@
           <a:p>
             <a:fld id="{0FD4F65F-40B7-4D2C-9F56-28E1AB17EB0A}" type="datetimeFigureOut">
               <a:rPr lang="tr-TR" smtClean="0"/>
-              <a:t>2.05.2023</a:t>
+              <a:t>14.09.2024</a:t>
             </a:fld>
             <a:endParaRPr lang="tr-TR"/>
           </a:p>
@@ -2811,7 +2810,7 @@
           <a:p>
             <a:fld id="{0FD4F65F-40B7-4D2C-9F56-28E1AB17EB0A}" type="datetimeFigureOut">
               <a:rPr lang="tr-TR" smtClean="0"/>
-              <a:t>2.05.2023</a:t>
+              <a:t>14.09.2024</a:t>
             </a:fld>
             <a:endParaRPr lang="tr-TR"/>
           </a:p>
@@ -2987,7 +2986,7 @@
           <a:p>
             <a:fld id="{0FD4F65F-40B7-4D2C-9F56-28E1AB17EB0A}" type="datetimeFigureOut">
               <a:rPr lang="tr-TR" smtClean="0"/>
-              <a:t>2.05.2023</a:t>
+              <a:t>14.09.2024</a:t>
             </a:fld>
             <a:endParaRPr lang="tr-TR"/>
           </a:p>
@@ -3234,7 +3233,7 @@
           <a:p>
             <a:fld id="{0FD4F65F-40B7-4D2C-9F56-28E1AB17EB0A}" type="datetimeFigureOut">
               <a:rPr lang="tr-TR" smtClean="0"/>
-              <a:t>2.05.2023</a:t>
+              <a:t>14.09.2024</a:t>
             </a:fld>
             <a:endParaRPr lang="tr-TR"/>
           </a:p>
@@ -3466,7 +3465,7 @@
           <a:p>
             <a:fld id="{0FD4F65F-40B7-4D2C-9F56-28E1AB17EB0A}" type="datetimeFigureOut">
               <a:rPr lang="tr-TR" smtClean="0"/>
-              <a:t>2.05.2023</a:t>
+              <a:t>14.09.2024</a:t>
             </a:fld>
             <a:endParaRPr lang="tr-TR"/>
           </a:p>
@@ -3840,7 +3839,7 @@
           <a:p>
             <a:fld id="{0FD4F65F-40B7-4D2C-9F56-28E1AB17EB0A}" type="datetimeFigureOut">
               <a:rPr lang="tr-TR" smtClean="0"/>
-              <a:t>2.05.2023</a:t>
+              <a:t>14.09.2024</a:t>
             </a:fld>
             <a:endParaRPr lang="tr-TR"/>
           </a:p>
@@ -3963,7 +3962,7 @@
           <a:p>
             <a:fld id="{0FD4F65F-40B7-4D2C-9F56-28E1AB17EB0A}" type="datetimeFigureOut">
               <a:rPr lang="tr-TR" smtClean="0"/>
-              <a:t>2.05.2023</a:t>
+              <a:t>14.09.2024</a:t>
             </a:fld>
             <a:endParaRPr lang="tr-TR"/>
           </a:p>
@@ -4058,7 +4057,7 @@
           <a:p>
             <a:fld id="{0FD4F65F-40B7-4D2C-9F56-28E1AB17EB0A}" type="datetimeFigureOut">
               <a:rPr lang="tr-TR" smtClean="0"/>
-              <a:t>2.05.2023</a:t>
+              <a:t>14.09.2024</a:t>
             </a:fld>
             <a:endParaRPr lang="tr-TR"/>
           </a:p>
@@ -4313,7 +4312,7 @@
           <a:p>
             <a:fld id="{0FD4F65F-40B7-4D2C-9F56-28E1AB17EB0A}" type="datetimeFigureOut">
               <a:rPr lang="tr-TR" smtClean="0"/>
-              <a:t>2.05.2023</a:t>
+              <a:t>14.09.2024</a:t>
             </a:fld>
             <a:endParaRPr lang="tr-TR"/>
           </a:p>
@@ -4576,7 +4575,7 @@
           <a:p>
             <a:fld id="{0FD4F65F-40B7-4D2C-9F56-28E1AB17EB0A}" type="datetimeFigureOut">
               <a:rPr lang="tr-TR" smtClean="0"/>
-              <a:t>2.05.2023</a:t>
+              <a:t>14.09.2024</a:t>
             </a:fld>
             <a:endParaRPr lang="tr-TR"/>
           </a:p>
@@ -5319,7 +5318,7 @@
           <a:p>
             <a:fld id="{0FD4F65F-40B7-4D2C-9F56-28E1AB17EB0A}" type="datetimeFigureOut">
               <a:rPr lang="tr-TR" smtClean="0"/>
-              <a:t>2.05.2023</a:t>
+              <a:t>14.09.2024</a:t>
             </a:fld>
             <a:endParaRPr lang="tr-TR"/>
           </a:p>
@@ -6255,6 +6254,13 @@
             <a:schemeClr val="lt1"/>
           </a:fontRef>
         </p:style>
+        <p:txBody>
+          <a:bodyPr/>
+          <a:lstStyle/>
+          <a:p>
+            <a:endParaRPr lang="tr-TR"/>
+          </a:p>
+        </p:txBody>
       </p:sp>
     </p:spTree>
     <p:extLst>
@@ -7183,116 +7189,6 @@
     <p:extLst>
       <p:ext uri="{BB962C8B-B14F-4D97-AF65-F5344CB8AC3E}">
         <p14:creationId xmlns:p14="http://schemas.microsoft.com/office/powerpoint/2010/main" val="190415621"/>
-      </p:ext>
-    </p:extLst>
-  </p:cSld>
-  <p:clrMapOvr>
-    <a:masterClrMapping/>
-  </p:clrMapOvr>
-</p:sld>
-</file>
-
-<file path=ppt/slides/slide15.xml><?xml version="1.0" encoding="utf-8"?>
-<p:sld xmlns:a="http://schemas.openxmlformats.org/drawingml/2006/main" xmlns:r="http://schemas.openxmlformats.org/officeDocument/2006/relationships" xmlns:p="http://schemas.openxmlformats.org/presentationml/2006/main">
-  <p:cSld>
-    <p:spTree>
-      <p:nvGrpSpPr>
-        <p:cNvPr id="1" name=""/>
-        <p:cNvGrpSpPr/>
-        <p:nvPr/>
-      </p:nvGrpSpPr>
-      <p:grpSpPr>
-        <a:xfrm>
-          <a:off x="0" y="0"/>
-          <a:ext cx="0" cy="0"/>
-          <a:chOff x="0" y="0"/>
-          <a:chExt cx="0" cy="0"/>
-        </a:xfrm>
-      </p:grpSpPr>
-      <p:sp>
-        <p:nvSpPr>
-          <p:cNvPr id="2" name="Başlık 1">
-            <a:extLst>
-              <a:ext uri="{FF2B5EF4-FFF2-40B4-BE49-F238E27FC236}">
-                <a16:creationId xmlns:a16="http://schemas.microsoft.com/office/drawing/2014/main" id="{31E65330-64DF-A910-96CD-FE49DE90B227}"/>
-              </a:ext>
-            </a:extLst>
-          </p:cNvPr>
-          <p:cNvSpPr>
-            <a:spLocks noGrp="1"/>
-          </p:cNvSpPr>
-          <p:nvPr>
-            <p:ph type="title"/>
-          </p:nvPr>
-        </p:nvSpPr>
-        <p:spPr/>
-        <p:txBody>
-          <a:bodyPr/>
-          <a:lstStyle/>
-          <a:p>
-            <a:r>
-              <a:rPr lang="tr-TR" dirty="0"/>
-              <a:t>DİNLEDİĞİNİZ İÇİN TEŞEKKÜRLER</a:t>
-            </a:r>
-          </a:p>
-        </p:txBody>
-      </p:sp>
-      <p:sp>
-        <p:nvSpPr>
-          <p:cNvPr id="3" name="İçerik Yer Tutucusu 2">
-            <a:extLst>
-              <a:ext uri="{FF2B5EF4-FFF2-40B4-BE49-F238E27FC236}">
-                <a16:creationId xmlns:a16="http://schemas.microsoft.com/office/drawing/2014/main" id="{B17B1737-0ED1-7BFA-8288-F7C6D81497FD}"/>
-              </a:ext>
-            </a:extLst>
-          </p:cNvPr>
-          <p:cNvSpPr>
-            <a:spLocks noGrp="1"/>
-          </p:cNvSpPr>
-          <p:nvPr>
-            <p:ph idx="1"/>
-          </p:nvPr>
-        </p:nvSpPr>
-        <p:spPr/>
-        <p:txBody>
-          <a:bodyPr/>
-          <a:lstStyle/>
-          <a:p>
-            <a:r>
-              <a:rPr lang="tr-TR"/>
-              <a:t>HARIZLAYANLAR:</a:t>
-            </a:r>
-          </a:p>
-          <a:p>
-            <a:r>
-              <a:rPr lang="tr-TR" dirty="0"/>
-              <a:t>ÖMER FARUK KOLCU </a:t>
-            </a:r>
-          </a:p>
-          <a:p>
-            <a:r>
-              <a:rPr lang="tr-TR" dirty="0"/>
-              <a:t>18010011014</a:t>
-            </a:r>
-          </a:p>
-          <a:p>
-            <a:r>
-              <a:rPr lang="tr-TR" dirty="0"/>
-              <a:t>ENGİNCAN DANABAŞ</a:t>
-            </a:r>
-          </a:p>
-          <a:p>
-            <a:r>
-              <a:rPr lang="tr-TR" dirty="0"/>
-              <a:t>19010011032</a:t>
-            </a:r>
-          </a:p>
-        </p:txBody>
-      </p:sp>
-    </p:spTree>
-    <p:extLst>
-      <p:ext uri="{BB962C8B-B14F-4D97-AF65-F5344CB8AC3E}">
-        <p14:creationId xmlns:p14="http://schemas.microsoft.com/office/powerpoint/2010/main" val="4131073746"/>
       </p:ext>
     </p:extLst>
   </p:cSld>

</xml_diff>